<commit_message>
Added Date and times and method overloading
</commit_message>
<xml_diff>
--- a/Lesson 5.pptx
+++ b/Lesson 5.pptx
@@ -5,7 +5,7 @@
     <p:sldMasterId id="2147483660" r:id="rId1"/>
   </p:sldMasterIdLst>
   <p:notesMasterIdLst>
-    <p:notesMasterId r:id="rId14"/>
+    <p:notesMasterId r:id="rId21"/>
   </p:notesMasterIdLst>
   <p:sldIdLst>
     <p:sldId id="257" r:id="rId2"/>
@@ -20,6 +20,13 @@
     <p:sldId id="267" r:id="rId11"/>
     <p:sldId id="266" r:id="rId12"/>
     <p:sldId id="268" r:id="rId13"/>
+    <p:sldId id="269" r:id="rId14"/>
+    <p:sldId id="270" r:id="rId15"/>
+    <p:sldId id="271" r:id="rId16"/>
+    <p:sldId id="272" r:id="rId17"/>
+    <p:sldId id="273" r:id="rId18"/>
+    <p:sldId id="274" r:id="rId19"/>
+    <p:sldId id="275" r:id="rId20"/>
   </p:sldIdLst>
   <p:sldSz cx="9144000" cy="6858000" type="screen4x3"/>
   <p:notesSz cx="6858000" cy="9144000"/>
@@ -203,7 +210,7 @@
           <a:p>
             <a:fld id="{BF22ED9C-E440-41D5-B2B1-1EECCC0B197C}" type="datetimeFigureOut">
               <a:rPr lang="en-US" smtClean="0"/>
-              <a:t>5/27/2014</a:t>
+              <a:t>5/28/2014</a:t>
             </a:fld>
             <a:endParaRPr lang="en-US"/>
           </a:p>
@@ -785,6 +792,518 @@
 </p:notes>
 </file>
 
+<file path=ppt/notesSlides/notesSlide12.xml><?xml version="1.0" encoding="utf-8"?>
+<p:notes xmlns:a="http://schemas.openxmlformats.org/drawingml/2006/main" xmlns:r="http://schemas.openxmlformats.org/officeDocument/2006/relationships" xmlns:p="http://schemas.openxmlformats.org/presentationml/2006/main">
+  <p:cSld>
+    <p:spTree>
+      <p:nvGrpSpPr>
+        <p:cNvPr id="1" name=""/>
+        <p:cNvGrpSpPr/>
+        <p:nvPr/>
+      </p:nvGrpSpPr>
+      <p:grpSpPr>
+        <a:xfrm>
+          <a:off x="0" y="0"/>
+          <a:ext cx="0" cy="0"/>
+          <a:chOff x="0" y="0"/>
+          <a:chExt cx="0" cy="0"/>
+        </a:xfrm>
+      </p:grpSpPr>
+      <p:sp>
+        <p:nvSpPr>
+          <p:cNvPr id="2" name="Slide Image Placeholder 1"/>
+          <p:cNvSpPr>
+            <a:spLocks noGrp="1" noRot="1" noChangeAspect="1"/>
+          </p:cNvSpPr>
+          <p:nvPr>
+            <p:ph type="sldImg"/>
+          </p:nvPr>
+        </p:nvSpPr>
+        <p:spPr/>
+      </p:sp>
+      <p:sp>
+        <p:nvSpPr>
+          <p:cNvPr id="3" name="Notes Placeholder 2"/>
+          <p:cNvSpPr>
+            <a:spLocks noGrp="1"/>
+          </p:cNvSpPr>
+          <p:nvPr>
+            <p:ph type="body" idx="1"/>
+          </p:nvPr>
+        </p:nvSpPr>
+        <p:spPr/>
+        <p:txBody>
+          <a:bodyPr/>
+          <a:lstStyle/>
+          <a:p>
+            <a:endParaRPr lang="en-US" dirty="0"/>
+          </a:p>
+        </p:txBody>
+      </p:sp>
+      <p:sp>
+        <p:nvSpPr>
+          <p:cNvPr id="4" name="Slide Number Placeholder 3"/>
+          <p:cNvSpPr>
+            <a:spLocks noGrp="1"/>
+          </p:cNvSpPr>
+          <p:nvPr>
+            <p:ph type="sldNum" sz="quarter" idx="10"/>
+          </p:nvPr>
+        </p:nvSpPr>
+        <p:spPr/>
+        <p:txBody>
+          <a:bodyPr/>
+          <a:lstStyle/>
+          <a:p>
+            <a:fld id="{9F7BC946-28EF-4B83-AFBF-DD002D92AA04}" type="slidenum">
+              <a:rPr lang="en-US" smtClean="0"/>
+              <a:t>14</a:t>
+            </a:fld>
+            <a:endParaRPr lang="en-US"/>
+          </a:p>
+        </p:txBody>
+      </p:sp>
+    </p:spTree>
+    <p:extLst>
+      <p:ext uri="{BB962C8B-B14F-4D97-AF65-F5344CB8AC3E}">
+        <p14:creationId xmlns:p14="http://schemas.microsoft.com/office/powerpoint/2010/main" val="2789113442"/>
+      </p:ext>
+    </p:extLst>
+  </p:cSld>
+  <p:clrMapOvr>
+    <a:masterClrMapping/>
+  </p:clrMapOvr>
+</p:notes>
+</file>
+
+<file path=ppt/notesSlides/notesSlide13.xml><?xml version="1.0" encoding="utf-8"?>
+<p:notes xmlns:a="http://schemas.openxmlformats.org/drawingml/2006/main" xmlns:r="http://schemas.openxmlformats.org/officeDocument/2006/relationships" xmlns:p="http://schemas.openxmlformats.org/presentationml/2006/main">
+  <p:cSld>
+    <p:spTree>
+      <p:nvGrpSpPr>
+        <p:cNvPr id="1" name=""/>
+        <p:cNvGrpSpPr/>
+        <p:nvPr/>
+      </p:nvGrpSpPr>
+      <p:grpSpPr>
+        <a:xfrm>
+          <a:off x="0" y="0"/>
+          <a:ext cx="0" cy="0"/>
+          <a:chOff x="0" y="0"/>
+          <a:chExt cx="0" cy="0"/>
+        </a:xfrm>
+      </p:grpSpPr>
+      <p:sp>
+        <p:nvSpPr>
+          <p:cNvPr id="2" name="Slide Image Placeholder 1"/>
+          <p:cNvSpPr>
+            <a:spLocks noGrp="1" noRot="1" noChangeAspect="1"/>
+          </p:cNvSpPr>
+          <p:nvPr>
+            <p:ph type="sldImg"/>
+          </p:nvPr>
+        </p:nvSpPr>
+        <p:spPr/>
+      </p:sp>
+      <p:sp>
+        <p:nvSpPr>
+          <p:cNvPr id="3" name="Notes Placeholder 2"/>
+          <p:cNvSpPr>
+            <a:spLocks noGrp="1"/>
+          </p:cNvSpPr>
+          <p:nvPr>
+            <p:ph type="body" idx="1"/>
+          </p:nvPr>
+        </p:nvSpPr>
+        <p:spPr/>
+        <p:txBody>
+          <a:bodyPr/>
+          <a:lstStyle/>
+          <a:p>
+            <a:r>
+              <a:rPr lang="en-US" dirty="0" smtClean="0"/>
+              <a:t>Use </a:t>
+            </a:r>
+            <a:r>
+              <a:rPr lang="en-US" dirty="0" err="1" smtClean="0"/>
+              <a:t>SimpleDateFormat</a:t>
+            </a:r>
+            <a:r>
+              <a:rPr lang="en-US" baseline="0" dirty="0" smtClean="0"/>
+              <a:t> to convert the date to a String.</a:t>
+            </a:r>
+          </a:p>
+          <a:p>
+            <a:r>
+              <a:rPr lang="en-US" baseline="0" dirty="0" smtClean="0"/>
+              <a:t>The date in Denmark looks different than here in US.</a:t>
+            </a:r>
+            <a:endParaRPr lang="en-US" dirty="0"/>
+          </a:p>
+        </p:txBody>
+      </p:sp>
+      <p:sp>
+        <p:nvSpPr>
+          <p:cNvPr id="4" name="Slide Number Placeholder 3"/>
+          <p:cNvSpPr>
+            <a:spLocks noGrp="1"/>
+          </p:cNvSpPr>
+          <p:nvPr>
+            <p:ph type="sldNum" sz="quarter" idx="10"/>
+          </p:nvPr>
+        </p:nvSpPr>
+        <p:spPr/>
+        <p:txBody>
+          <a:bodyPr/>
+          <a:lstStyle/>
+          <a:p>
+            <a:fld id="{9F7BC946-28EF-4B83-AFBF-DD002D92AA04}" type="slidenum">
+              <a:rPr lang="en-US" smtClean="0"/>
+              <a:t>15</a:t>
+            </a:fld>
+            <a:endParaRPr lang="en-US"/>
+          </a:p>
+        </p:txBody>
+      </p:sp>
+    </p:spTree>
+    <p:extLst>
+      <p:ext uri="{BB962C8B-B14F-4D97-AF65-F5344CB8AC3E}">
+        <p14:creationId xmlns:p14="http://schemas.microsoft.com/office/powerpoint/2010/main" val="3323645458"/>
+      </p:ext>
+    </p:extLst>
+  </p:cSld>
+  <p:clrMapOvr>
+    <a:masterClrMapping/>
+  </p:clrMapOvr>
+</p:notes>
+</file>
+
+<file path=ppt/notesSlides/notesSlide14.xml><?xml version="1.0" encoding="utf-8"?>
+<p:notes xmlns:a="http://schemas.openxmlformats.org/drawingml/2006/main" xmlns:r="http://schemas.openxmlformats.org/officeDocument/2006/relationships" xmlns:p="http://schemas.openxmlformats.org/presentationml/2006/main">
+  <p:cSld>
+    <p:spTree>
+      <p:nvGrpSpPr>
+        <p:cNvPr id="1" name=""/>
+        <p:cNvGrpSpPr/>
+        <p:nvPr/>
+      </p:nvGrpSpPr>
+      <p:grpSpPr>
+        <a:xfrm>
+          <a:off x="0" y="0"/>
+          <a:ext cx="0" cy="0"/>
+          <a:chOff x="0" y="0"/>
+          <a:chExt cx="0" cy="0"/>
+        </a:xfrm>
+      </p:grpSpPr>
+      <p:sp>
+        <p:nvSpPr>
+          <p:cNvPr id="2" name="Slide Image Placeholder 1"/>
+          <p:cNvSpPr>
+            <a:spLocks noGrp="1" noRot="1" noChangeAspect="1"/>
+          </p:cNvSpPr>
+          <p:nvPr>
+            <p:ph type="sldImg"/>
+          </p:nvPr>
+        </p:nvSpPr>
+        <p:spPr/>
+      </p:sp>
+      <p:sp>
+        <p:nvSpPr>
+          <p:cNvPr id="3" name="Notes Placeholder 2"/>
+          <p:cNvSpPr>
+            <a:spLocks noGrp="1"/>
+          </p:cNvSpPr>
+          <p:nvPr>
+            <p:ph type="body" idx="1"/>
+          </p:nvPr>
+        </p:nvSpPr>
+        <p:spPr/>
+        <p:txBody>
+          <a:bodyPr/>
+          <a:lstStyle/>
+          <a:p>
+            <a:r>
+              <a:rPr lang="en-US" dirty="0" smtClean="0"/>
+              <a:t>Of course</a:t>
+            </a:r>
+            <a:r>
+              <a:rPr lang="en-US" baseline="0" dirty="0" smtClean="0"/>
+              <a:t> we need a test.</a:t>
+            </a:r>
+          </a:p>
+          <a:p>
+            <a:r>
+              <a:rPr lang="en-US" baseline="0" dirty="0" smtClean="0"/>
+              <a:t>Different parts of the world use different formats for date.</a:t>
+            </a:r>
+          </a:p>
+          <a:p>
+            <a:r>
+              <a:rPr lang="en-US" baseline="0" dirty="0" smtClean="0"/>
+              <a:t>Notice that the Date object is constructed with a ‘0’ argument. That means 0 milliseconds after epoch. Since it is GMT, and we are PDT (GMT -8), it becomes the day before.</a:t>
+            </a:r>
+            <a:endParaRPr lang="en-US" dirty="0"/>
+          </a:p>
+        </p:txBody>
+      </p:sp>
+      <p:sp>
+        <p:nvSpPr>
+          <p:cNvPr id="4" name="Slide Number Placeholder 3"/>
+          <p:cNvSpPr>
+            <a:spLocks noGrp="1"/>
+          </p:cNvSpPr>
+          <p:nvPr>
+            <p:ph type="sldNum" sz="quarter" idx="10"/>
+          </p:nvPr>
+        </p:nvSpPr>
+        <p:spPr/>
+        <p:txBody>
+          <a:bodyPr/>
+          <a:lstStyle/>
+          <a:p>
+            <a:fld id="{9F7BC946-28EF-4B83-AFBF-DD002D92AA04}" type="slidenum">
+              <a:rPr lang="en-US" smtClean="0"/>
+              <a:t>16</a:t>
+            </a:fld>
+            <a:endParaRPr lang="en-US"/>
+          </a:p>
+        </p:txBody>
+      </p:sp>
+    </p:spTree>
+    <p:extLst>
+      <p:ext uri="{BB962C8B-B14F-4D97-AF65-F5344CB8AC3E}">
+        <p14:creationId xmlns:p14="http://schemas.microsoft.com/office/powerpoint/2010/main" val="2020818061"/>
+      </p:ext>
+    </p:extLst>
+  </p:cSld>
+  <p:clrMapOvr>
+    <a:masterClrMapping/>
+  </p:clrMapOvr>
+</p:notes>
+</file>
+
+<file path=ppt/notesSlides/notesSlide15.xml><?xml version="1.0" encoding="utf-8"?>
+<p:notes xmlns:a="http://schemas.openxmlformats.org/drawingml/2006/main" xmlns:r="http://schemas.openxmlformats.org/officeDocument/2006/relationships" xmlns:p="http://schemas.openxmlformats.org/presentationml/2006/main">
+  <p:cSld>
+    <p:spTree>
+      <p:nvGrpSpPr>
+        <p:cNvPr id="1" name=""/>
+        <p:cNvGrpSpPr/>
+        <p:nvPr/>
+      </p:nvGrpSpPr>
+      <p:grpSpPr>
+        <a:xfrm>
+          <a:off x="0" y="0"/>
+          <a:ext cx="0" cy="0"/>
+          <a:chOff x="0" y="0"/>
+          <a:chExt cx="0" cy="0"/>
+        </a:xfrm>
+      </p:grpSpPr>
+      <p:sp>
+        <p:nvSpPr>
+          <p:cNvPr id="2" name="Slide Image Placeholder 1"/>
+          <p:cNvSpPr>
+            <a:spLocks noGrp="1" noRot="1" noChangeAspect="1"/>
+          </p:cNvSpPr>
+          <p:nvPr>
+            <p:ph type="sldImg"/>
+          </p:nvPr>
+        </p:nvSpPr>
+        <p:spPr/>
+      </p:sp>
+      <p:sp>
+        <p:nvSpPr>
+          <p:cNvPr id="3" name="Notes Placeholder 2"/>
+          <p:cNvSpPr>
+            <a:spLocks noGrp="1"/>
+          </p:cNvSpPr>
+          <p:nvPr>
+            <p:ph type="body" idx="1"/>
+          </p:nvPr>
+        </p:nvSpPr>
+        <p:spPr/>
+        <p:txBody>
+          <a:bodyPr/>
+          <a:lstStyle/>
+          <a:p>
+            <a:r>
+              <a:rPr lang="en-US" dirty="0" smtClean="0"/>
+              <a:t>You can also make</a:t>
+            </a:r>
+            <a:r>
+              <a:rPr lang="en-US" baseline="0" dirty="0" smtClean="0"/>
+              <a:t> a String into a Date using the ‘parse’ method in </a:t>
+            </a:r>
+            <a:r>
+              <a:rPr lang="en-US" baseline="0" dirty="0" err="1" smtClean="0"/>
+              <a:t>SimpleDateFormat</a:t>
+            </a:r>
+            <a:r>
+              <a:rPr lang="en-US" baseline="0" dirty="0" smtClean="0"/>
+              <a:t>.</a:t>
+            </a:r>
+          </a:p>
+          <a:p>
+            <a:r>
+              <a:rPr lang="en-US" baseline="0" dirty="0" smtClean="0"/>
+              <a:t>Because of the time zone, we need to set the ‘HOUR_OF_DAY’ correctly to get back to the same value as ‘new Date(0)’.</a:t>
+            </a:r>
+          </a:p>
+          <a:p>
+            <a:r>
+              <a:rPr lang="en-US" baseline="0" dirty="0" smtClean="0"/>
+              <a:t>The Calendar class has convenient methods to do this for us.</a:t>
+            </a:r>
+          </a:p>
+          <a:p>
+            <a:endParaRPr lang="en-US" dirty="0"/>
+          </a:p>
+        </p:txBody>
+      </p:sp>
+      <p:sp>
+        <p:nvSpPr>
+          <p:cNvPr id="4" name="Slide Number Placeholder 3"/>
+          <p:cNvSpPr>
+            <a:spLocks noGrp="1"/>
+          </p:cNvSpPr>
+          <p:nvPr>
+            <p:ph type="sldNum" sz="quarter" idx="10"/>
+          </p:nvPr>
+        </p:nvSpPr>
+        <p:spPr/>
+        <p:txBody>
+          <a:bodyPr/>
+          <a:lstStyle/>
+          <a:p>
+            <a:fld id="{9F7BC946-28EF-4B83-AFBF-DD002D92AA04}" type="slidenum">
+              <a:rPr lang="en-US" smtClean="0"/>
+              <a:t>17</a:t>
+            </a:fld>
+            <a:endParaRPr lang="en-US"/>
+          </a:p>
+        </p:txBody>
+      </p:sp>
+    </p:spTree>
+    <p:extLst>
+      <p:ext uri="{BB962C8B-B14F-4D97-AF65-F5344CB8AC3E}">
+        <p14:creationId xmlns:p14="http://schemas.microsoft.com/office/powerpoint/2010/main" val="1121357102"/>
+      </p:ext>
+    </p:extLst>
+  </p:cSld>
+  <p:clrMapOvr>
+    <a:masterClrMapping/>
+  </p:clrMapOvr>
+</p:notes>
+</file>
+
+<file path=ppt/notesSlides/notesSlide16.xml><?xml version="1.0" encoding="utf-8"?>
+<p:notes xmlns:a="http://schemas.openxmlformats.org/drawingml/2006/main" xmlns:r="http://schemas.openxmlformats.org/officeDocument/2006/relationships" xmlns:p="http://schemas.openxmlformats.org/presentationml/2006/main">
+  <p:cSld>
+    <p:spTree>
+      <p:nvGrpSpPr>
+        <p:cNvPr id="1" name=""/>
+        <p:cNvGrpSpPr/>
+        <p:nvPr/>
+      </p:nvGrpSpPr>
+      <p:grpSpPr>
+        <a:xfrm>
+          <a:off x="0" y="0"/>
+          <a:ext cx="0" cy="0"/>
+          <a:chOff x="0" y="0"/>
+          <a:chExt cx="0" cy="0"/>
+        </a:xfrm>
+      </p:grpSpPr>
+      <p:sp>
+        <p:nvSpPr>
+          <p:cNvPr id="2" name="Slide Image Placeholder 1"/>
+          <p:cNvSpPr>
+            <a:spLocks noGrp="1" noRot="1" noChangeAspect="1"/>
+          </p:cNvSpPr>
+          <p:nvPr>
+            <p:ph type="sldImg"/>
+          </p:nvPr>
+        </p:nvSpPr>
+        <p:spPr/>
+      </p:sp>
+      <p:sp>
+        <p:nvSpPr>
+          <p:cNvPr id="3" name="Notes Placeholder 2"/>
+          <p:cNvSpPr>
+            <a:spLocks noGrp="1"/>
+          </p:cNvSpPr>
+          <p:nvPr>
+            <p:ph type="body" idx="1"/>
+          </p:nvPr>
+        </p:nvSpPr>
+        <p:spPr/>
+        <p:txBody>
+          <a:bodyPr/>
+          <a:lstStyle/>
+          <a:p>
+            <a:r>
+              <a:rPr lang="en-US" dirty="0" smtClean="0"/>
+              <a:t>In our </a:t>
+            </a:r>
+            <a:r>
+              <a:rPr lang="en-US" dirty="0" err="1" smtClean="0"/>
+              <a:t>TimeTraveller</a:t>
+            </a:r>
+            <a:r>
+              <a:rPr lang="en-US" dirty="0" smtClean="0"/>
+              <a:t> class, we could have two</a:t>
+            </a:r>
+            <a:r>
+              <a:rPr lang="en-US" baseline="0" dirty="0" smtClean="0"/>
+              <a:t> overloaded ‘</a:t>
+            </a:r>
+            <a:r>
+              <a:rPr lang="en-US" baseline="0" dirty="0" err="1" smtClean="0"/>
+              <a:t>toString</a:t>
+            </a:r>
+            <a:r>
+              <a:rPr lang="en-US" baseline="0" dirty="0" smtClean="0"/>
+              <a:t>’ methods. One that takes two arguments; Date, and Locale, and one that only takes Date. One method will then delegate to the other method passing the default parameter.</a:t>
+            </a:r>
+            <a:endParaRPr lang="en-US" dirty="0"/>
+          </a:p>
+        </p:txBody>
+      </p:sp>
+      <p:sp>
+        <p:nvSpPr>
+          <p:cNvPr id="4" name="Slide Number Placeholder 3"/>
+          <p:cNvSpPr>
+            <a:spLocks noGrp="1"/>
+          </p:cNvSpPr>
+          <p:nvPr>
+            <p:ph type="sldNum" sz="quarter" idx="10"/>
+          </p:nvPr>
+        </p:nvSpPr>
+        <p:spPr/>
+        <p:txBody>
+          <a:bodyPr/>
+          <a:lstStyle/>
+          <a:p>
+            <a:fld id="{9F7BC946-28EF-4B83-AFBF-DD002D92AA04}" type="slidenum">
+              <a:rPr lang="en-US" smtClean="0"/>
+              <a:t>19</a:t>
+            </a:fld>
+            <a:endParaRPr lang="en-US"/>
+          </a:p>
+        </p:txBody>
+      </p:sp>
+    </p:spTree>
+    <p:extLst>
+      <p:ext uri="{BB962C8B-B14F-4D97-AF65-F5344CB8AC3E}">
+        <p14:creationId xmlns:p14="http://schemas.microsoft.com/office/powerpoint/2010/main" val="1134380128"/>
+      </p:ext>
+    </p:extLst>
+  </p:cSld>
+  <p:clrMapOvr>
+    <a:masterClrMapping/>
+  </p:clrMapOvr>
+</p:notes>
+</file>
+
 <file path=ppt/notesSlides/notesSlide2.xml><?xml version="1.0" encoding="utf-8"?>
 <p:notes xmlns:a="http://schemas.openxmlformats.org/drawingml/2006/main" xmlns:r="http://schemas.openxmlformats.org/officeDocument/2006/relationships" xmlns:p="http://schemas.openxmlformats.org/presentationml/2006/main">
   <p:cSld>
@@ -1986,7 +2505,7 @@
           <a:p>
             <a:fld id="{D90C798C-6A35-41EE-942B-15467D9E93C0}" type="datetimeFigureOut">
               <a:rPr lang="en-US" smtClean="0"/>
-              <a:t>5/27/2014</a:t>
+              <a:t>5/28/2014</a:t>
             </a:fld>
             <a:endParaRPr lang="en-US"/>
           </a:p>
@@ -2163,7 +2682,7 @@
           <a:p>
             <a:fld id="{D90C798C-6A35-41EE-942B-15467D9E93C0}" type="datetimeFigureOut">
               <a:rPr lang="en-US" smtClean="0"/>
-              <a:t>5/27/2014</a:t>
+              <a:t>5/28/2014</a:t>
             </a:fld>
             <a:endParaRPr lang="en-US"/>
           </a:p>
@@ -2343,7 +2862,7 @@
           <a:p>
             <a:fld id="{D90C798C-6A35-41EE-942B-15467D9E93C0}" type="datetimeFigureOut">
               <a:rPr lang="en-US" smtClean="0"/>
-              <a:t>5/27/2014</a:t>
+              <a:t>5/28/2014</a:t>
             </a:fld>
             <a:endParaRPr lang="en-US"/>
           </a:p>
@@ -2513,7 +3032,7 @@
           <a:p>
             <a:fld id="{D90C798C-6A35-41EE-942B-15467D9E93C0}" type="datetimeFigureOut">
               <a:rPr lang="en-US" smtClean="0"/>
-              <a:t>5/27/2014</a:t>
+              <a:t>5/28/2014</a:t>
             </a:fld>
             <a:endParaRPr lang="en-US"/>
           </a:p>
@@ -2766,7 +3285,7 @@
           <a:p>
             <a:fld id="{D90C798C-6A35-41EE-942B-15467D9E93C0}" type="datetimeFigureOut">
               <a:rPr lang="en-US" smtClean="0"/>
-              <a:t>5/27/2014</a:t>
+              <a:t>5/28/2014</a:t>
             </a:fld>
             <a:endParaRPr lang="en-US"/>
           </a:p>
@@ -3061,7 +3580,7 @@
           <a:p>
             <a:fld id="{D90C798C-6A35-41EE-942B-15467D9E93C0}" type="datetimeFigureOut">
               <a:rPr lang="en-US" smtClean="0"/>
-              <a:t>5/27/2014</a:t>
+              <a:t>5/28/2014</a:t>
             </a:fld>
             <a:endParaRPr lang="en-US"/>
           </a:p>
@@ -3483,7 +4002,7 @@
           <a:p>
             <a:fld id="{D90C798C-6A35-41EE-942B-15467D9E93C0}" type="datetimeFigureOut">
               <a:rPr lang="en-US" smtClean="0"/>
-              <a:t>5/27/2014</a:t>
+              <a:t>5/28/2014</a:t>
             </a:fld>
             <a:endParaRPr lang="en-US"/>
           </a:p>
@@ -3601,7 +4120,7 @@
           <a:p>
             <a:fld id="{D90C798C-6A35-41EE-942B-15467D9E93C0}" type="datetimeFigureOut">
               <a:rPr lang="en-US" smtClean="0"/>
-              <a:t>5/27/2014</a:t>
+              <a:t>5/28/2014</a:t>
             </a:fld>
             <a:endParaRPr lang="en-US"/>
           </a:p>
@@ -3696,7 +4215,7 @@
           <a:p>
             <a:fld id="{D90C798C-6A35-41EE-942B-15467D9E93C0}" type="datetimeFigureOut">
               <a:rPr lang="en-US" smtClean="0"/>
-              <a:t>5/27/2014</a:t>
+              <a:t>5/28/2014</a:t>
             </a:fld>
             <a:endParaRPr lang="en-US"/>
           </a:p>
@@ -3973,7 +4492,7 @@
           <a:p>
             <a:fld id="{D90C798C-6A35-41EE-942B-15467D9E93C0}" type="datetimeFigureOut">
               <a:rPr lang="en-US" smtClean="0"/>
-              <a:t>5/27/2014</a:t>
+              <a:t>5/28/2014</a:t>
             </a:fld>
             <a:endParaRPr lang="en-US"/>
           </a:p>
@@ -4230,7 +4749,7 @@
           <a:p>
             <a:fld id="{D90C798C-6A35-41EE-942B-15467D9E93C0}" type="datetimeFigureOut">
               <a:rPr lang="en-US" smtClean="0"/>
-              <a:t>5/27/2014</a:t>
+              <a:t>5/28/2014</a:t>
             </a:fld>
             <a:endParaRPr lang="en-US"/>
           </a:p>
@@ -4453,7 +4972,7 @@
           <a:p>
             <a:fld id="{D90C798C-6A35-41EE-942B-15467D9E93C0}" type="datetimeFigureOut">
               <a:rPr lang="en-US" smtClean="0"/>
-              <a:t>5/27/2014</a:t>
+              <a:t>5/28/2014</a:t>
             </a:fld>
             <a:endParaRPr lang="en-US"/>
           </a:p>
@@ -5080,7 +5599,7 @@
           <a:p>
             <a:fld id="{D913314C-B8FD-4B41-89DB-0C633265091B}" type="datetime1">
               <a:rPr lang="en-US" smtClean="0"/>
-              <a:t>5/27/2014</a:t>
+              <a:t>5/28/2014</a:t>
             </a:fld>
             <a:endParaRPr lang="en-US"/>
           </a:p>
@@ -5607,6 +6126,1055 @@
     <p:extLst>
       <p:ext uri="{BB962C8B-B14F-4D97-AF65-F5344CB8AC3E}">
         <p14:creationId xmlns:p14="http://schemas.microsoft.com/office/powerpoint/2010/main" val="1167506055"/>
+      </p:ext>
+    </p:extLst>
+  </p:cSld>
+  <p:clrMapOvr>
+    <a:masterClrMapping/>
+  </p:clrMapOvr>
+  <p:timing>
+    <p:tnLst>
+      <p:par>
+        <p:cTn id="1" dur="indefinite" restart="never" nodeType="tmRoot"/>
+      </p:par>
+    </p:tnLst>
+  </p:timing>
+</p:sld>
+</file>
+
+<file path=ppt/slides/slide13.xml><?xml version="1.0" encoding="utf-8"?>
+<p:sld xmlns:a="http://schemas.openxmlformats.org/drawingml/2006/main" xmlns:r="http://schemas.openxmlformats.org/officeDocument/2006/relationships" xmlns:p="http://schemas.openxmlformats.org/presentationml/2006/main">
+  <p:cSld>
+    <p:spTree>
+      <p:nvGrpSpPr>
+        <p:cNvPr id="1" name=""/>
+        <p:cNvGrpSpPr/>
+        <p:nvPr/>
+      </p:nvGrpSpPr>
+      <p:grpSpPr>
+        <a:xfrm>
+          <a:off x="0" y="0"/>
+          <a:ext cx="0" cy="0"/>
+          <a:chOff x="0" y="0"/>
+          <a:chExt cx="0" cy="0"/>
+        </a:xfrm>
+      </p:grpSpPr>
+      <p:sp>
+        <p:nvSpPr>
+          <p:cNvPr id="2" name="Title 1"/>
+          <p:cNvSpPr>
+            <a:spLocks noGrp="1"/>
+          </p:cNvSpPr>
+          <p:nvPr>
+            <p:ph type="title"/>
+          </p:nvPr>
+        </p:nvSpPr>
+        <p:spPr/>
+        <p:txBody>
+          <a:bodyPr/>
+          <a:lstStyle/>
+          <a:p>
+            <a:r>
+              <a:rPr lang="en-US" dirty="0" smtClean="0"/>
+              <a:t>Dates and time</a:t>
+            </a:r>
+            <a:endParaRPr lang="en-US" dirty="0"/>
+          </a:p>
+        </p:txBody>
+      </p:sp>
+      <p:sp>
+        <p:nvSpPr>
+          <p:cNvPr id="3" name="Content Placeholder 2"/>
+          <p:cNvSpPr>
+            <a:spLocks noGrp="1"/>
+          </p:cNvSpPr>
+          <p:nvPr>
+            <p:ph idx="1"/>
+          </p:nvPr>
+        </p:nvSpPr>
+        <p:spPr/>
+        <p:txBody>
+          <a:bodyPr/>
+          <a:lstStyle/>
+          <a:p>
+            <a:pPr marL="0" indent="0">
+              <a:buNone/>
+            </a:pPr>
+            <a:r>
+              <a:rPr lang="en-US" dirty="0" smtClean="0"/>
+              <a:t>Classes that deal with Date, Time, and its format:</a:t>
+            </a:r>
+          </a:p>
+          <a:p>
+            <a:pPr marL="400050" lvl="1" indent="0">
+              <a:buNone/>
+            </a:pPr>
+            <a:r>
+              <a:rPr lang="en-US" dirty="0" err="1" smtClean="0"/>
+              <a:t>java.util.Date</a:t>
+            </a:r>
+            <a:endParaRPr lang="en-US" dirty="0" smtClean="0"/>
+          </a:p>
+          <a:p>
+            <a:pPr marL="400050" lvl="1" indent="0">
+              <a:buNone/>
+            </a:pPr>
+            <a:r>
+              <a:rPr lang="en-US" dirty="0" err="1" smtClean="0"/>
+              <a:t>java.text.SimpleDateFormat</a:t>
+            </a:r>
+            <a:endParaRPr lang="en-US" dirty="0" smtClean="0"/>
+          </a:p>
+        </p:txBody>
+      </p:sp>
+    </p:spTree>
+    <p:extLst>
+      <p:ext uri="{BB962C8B-B14F-4D97-AF65-F5344CB8AC3E}">
+        <p14:creationId xmlns:p14="http://schemas.microsoft.com/office/powerpoint/2010/main" val="2928509666"/>
+      </p:ext>
+    </p:extLst>
+  </p:cSld>
+  <p:clrMapOvr>
+    <a:masterClrMapping/>
+  </p:clrMapOvr>
+  <p:timing>
+    <p:tnLst>
+      <p:par>
+        <p:cTn id="1" dur="indefinite" restart="never" nodeType="tmRoot"/>
+      </p:par>
+    </p:tnLst>
+  </p:timing>
+</p:sld>
+</file>
+
+<file path=ppt/slides/slide14.xml><?xml version="1.0" encoding="utf-8"?>
+<p:sld xmlns:a="http://schemas.openxmlformats.org/drawingml/2006/main" xmlns:r="http://schemas.openxmlformats.org/officeDocument/2006/relationships" xmlns:p="http://schemas.openxmlformats.org/presentationml/2006/main">
+  <p:cSld>
+    <p:spTree>
+      <p:nvGrpSpPr>
+        <p:cNvPr id="1" name=""/>
+        <p:cNvGrpSpPr/>
+        <p:nvPr/>
+      </p:nvGrpSpPr>
+      <p:grpSpPr>
+        <a:xfrm>
+          <a:off x="0" y="0"/>
+          <a:ext cx="0" cy="0"/>
+          <a:chOff x="0" y="0"/>
+          <a:chExt cx="0" cy="0"/>
+        </a:xfrm>
+      </p:grpSpPr>
+      <p:sp>
+        <p:nvSpPr>
+          <p:cNvPr id="2" name="Title 1"/>
+          <p:cNvSpPr>
+            <a:spLocks noGrp="1"/>
+          </p:cNvSpPr>
+          <p:nvPr>
+            <p:ph type="title"/>
+          </p:nvPr>
+        </p:nvSpPr>
+        <p:spPr/>
+        <p:txBody>
+          <a:bodyPr/>
+          <a:lstStyle/>
+          <a:p>
+            <a:r>
+              <a:rPr lang="en-US" dirty="0" smtClean="0"/>
+              <a:t>Dates and time</a:t>
+            </a:r>
+            <a:endParaRPr lang="en-US" dirty="0"/>
+          </a:p>
+        </p:txBody>
+      </p:sp>
+      <p:sp>
+        <p:nvSpPr>
+          <p:cNvPr id="3" name="Content Placeholder 2"/>
+          <p:cNvSpPr>
+            <a:spLocks noGrp="1"/>
+          </p:cNvSpPr>
+          <p:nvPr>
+            <p:ph idx="1"/>
+          </p:nvPr>
+        </p:nvSpPr>
+        <p:spPr/>
+        <p:txBody>
+          <a:bodyPr/>
+          <a:lstStyle/>
+          <a:p>
+            <a:pPr marL="0" indent="0">
+              <a:buNone/>
+            </a:pPr>
+            <a:r>
+              <a:rPr lang="en-US" dirty="0" smtClean="0"/>
+              <a:t>To get the current date and time, you construct a new instance of Date.</a:t>
+            </a:r>
+            <a:endParaRPr lang="en-US" dirty="0"/>
+          </a:p>
+        </p:txBody>
+      </p:sp>
+      <p:pic>
+        <p:nvPicPr>
+          <p:cNvPr id="1026" name="Picture 2"/>
+          <p:cNvPicPr>
+            <a:picLocks noChangeAspect="1" noChangeArrowheads="1"/>
+          </p:cNvPicPr>
+          <p:nvPr/>
+        </p:nvPicPr>
+        <p:blipFill>
+          <a:blip r:embed="rId3">
+            <a:extLst>
+              <a:ext uri="{28A0092B-C50C-407E-A947-70E740481C1C}">
+                <a14:useLocalDpi xmlns:a14="http://schemas.microsoft.com/office/drawing/2010/main" val="0"/>
+              </a:ext>
+            </a:extLst>
+          </a:blip>
+          <a:srcRect/>
+          <a:stretch>
+            <a:fillRect/>
+          </a:stretch>
+        </p:blipFill>
+        <p:spPr bwMode="auto">
+          <a:xfrm>
+            <a:off x="2438400" y="3048000"/>
+            <a:ext cx="4100513" cy="2228850"/>
+          </a:xfrm>
+          <a:prstGeom prst="rect">
+            <a:avLst/>
+          </a:prstGeom>
+          <a:noFill/>
+          <a:ln>
+            <a:noFill/>
+          </a:ln>
+          <a:extLst>
+            <a:ext uri="{909E8E84-426E-40DD-AFC4-6F175D3DCCD1}">
+              <a14:hiddenFill xmlns:a14="http://schemas.microsoft.com/office/drawing/2010/main">
+                <a:solidFill>
+                  <a:schemeClr val="accent1"/>
+                </a:solidFill>
+              </a14:hiddenFill>
+            </a:ext>
+            <a:ext uri="{91240B29-F687-4F45-9708-019B960494DF}">
+              <a14:hiddenLine xmlns:a14="http://schemas.microsoft.com/office/drawing/2010/main" w="9525">
+                <a:solidFill>
+                  <a:schemeClr val="tx1"/>
+                </a:solidFill>
+                <a:miter lim="800000"/>
+                <a:headEnd/>
+                <a:tailEnd/>
+              </a14:hiddenLine>
+            </a:ext>
+          </a:extLst>
+        </p:spPr>
+      </p:pic>
+    </p:spTree>
+    <p:extLst>
+      <p:ext uri="{BB962C8B-B14F-4D97-AF65-F5344CB8AC3E}">
+        <p14:creationId xmlns:p14="http://schemas.microsoft.com/office/powerpoint/2010/main" val="38730094"/>
+      </p:ext>
+    </p:extLst>
+  </p:cSld>
+  <p:clrMapOvr>
+    <a:masterClrMapping/>
+  </p:clrMapOvr>
+  <p:timing>
+    <p:tnLst>
+      <p:par>
+        <p:cTn id="1" dur="indefinite" restart="never" nodeType="tmRoot"/>
+      </p:par>
+    </p:tnLst>
+  </p:timing>
+</p:sld>
+</file>
+
+<file path=ppt/slides/slide15.xml><?xml version="1.0" encoding="utf-8"?>
+<p:sld xmlns:a="http://schemas.openxmlformats.org/drawingml/2006/main" xmlns:r="http://schemas.openxmlformats.org/officeDocument/2006/relationships" xmlns:p="http://schemas.openxmlformats.org/presentationml/2006/main">
+  <p:cSld>
+    <p:spTree>
+      <p:nvGrpSpPr>
+        <p:cNvPr id="1" name=""/>
+        <p:cNvGrpSpPr/>
+        <p:nvPr/>
+      </p:nvGrpSpPr>
+      <p:grpSpPr>
+        <a:xfrm>
+          <a:off x="0" y="0"/>
+          <a:ext cx="0" cy="0"/>
+          <a:chOff x="0" y="0"/>
+          <a:chExt cx="0" cy="0"/>
+        </a:xfrm>
+      </p:grpSpPr>
+      <p:sp>
+        <p:nvSpPr>
+          <p:cNvPr id="2" name="Title 1"/>
+          <p:cNvSpPr>
+            <a:spLocks noGrp="1"/>
+          </p:cNvSpPr>
+          <p:nvPr>
+            <p:ph type="title"/>
+          </p:nvPr>
+        </p:nvSpPr>
+        <p:spPr/>
+        <p:txBody>
+          <a:bodyPr/>
+          <a:lstStyle/>
+          <a:p>
+            <a:r>
+              <a:rPr lang="en-US" dirty="0" smtClean="0"/>
+              <a:t>Dates and time</a:t>
+            </a:r>
+            <a:endParaRPr lang="en-US" dirty="0"/>
+          </a:p>
+        </p:txBody>
+      </p:sp>
+      <p:pic>
+        <p:nvPicPr>
+          <p:cNvPr id="2050" name="Picture 2"/>
+          <p:cNvPicPr>
+            <a:picLocks noChangeAspect="1" noChangeArrowheads="1"/>
+          </p:cNvPicPr>
+          <p:nvPr/>
+        </p:nvPicPr>
+        <p:blipFill>
+          <a:blip r:embed="rId3">
+            <a:extLst>
+              <a:ext uri="{28A0092B-C50C-407E-A947-70E740481C1C}">
+                <a14:useLocalDpi xmlns:a14="http://schemas.microsoft.com/office/drawing/2010/main" val="0"/>
+              </a:ext>
+            </a:extLst>
+          </a:blip>
+          <a:srcRect/>
+          <a:stretch>
+            <a:fillRect/>
+          </a:stretch>
+        </p:blipFill>
+        <p:spPr bwMode="auto">
+          <a:xfrm>
+            <a:off x="533400" y="1676400"/>
+            <a:ext cx="8215313" cy="4572000"/>
+          </a:xfrm>
+          <a:prstGeom prst="rect">
+            <a:avLst/>
+          </a:prstGeom>
+          <a:noFill/>
+          <a:ln>
+            <a:noFill/>
+          </a:ln>
+          <a:extLst>
+            <a:ext uri="{909E8E84-426E-40DD-AFC4-6F175D3DCCD1}">
+              <a14:hiddenFill xmlns:a14="http://schemas.microsoft.com/office/drawing/2010/main">
+                <a:solidFill>
+                  <a:schemeClr val="accent1"/>
+                </a:solidFill>
+              </a14:hiddenFill>
+            </a:ext>
+            <a:ext uri="{91240B29-F687-4F45-9708-019B960494DF}">
+              <a14:hiddenLine xmlns:a14="http://schemas.microsoft.com/office/drawing/2010/main" w="9525">
+                <a:solidFill>
+                  <a:schemeClr val="tx1"/>
+                </a:solidFill>
+                <a:miter lim="800000"/>
+                <a:headEnd/>
+                <a:tailEnd/>
+              </a14:hiddenLine>
+            </a:ext>
+          </a:extLst>
+        </p:spPr>
+      </p:pic>
+    </p:spTree>
+    <p:extLst>
+      <p:ext uri="{BB962C8B-B14F-4D97-AF65-F5344CB8AC3E}">
+        <p14:creationId xmlns:p14="http://schemas.microsoft.com/office/powerpoint/2010/main" val="1624480733"/>
+      </p:ext>
+    </p:extLst>
+  </p:cSld>
+  <p:clrMapOvr>
+    <a:masterClrMapping/>
+  </p:clrMapOvr>
+  <p:timing>
+    <p:tnLst>
+      <p:par>
+        <p:cTn id="1" dur="indefinite" restart="never" nodeType="tmRoot"/>
+      </p:par>
+    </p:tnLst>
+  </p:timing>
+</p:sld>
+</file>
+
+<file path=ppt/slides/slide16.xml><?xml version="1.0" encoding="utf-8"?>
+<p:sld xmlns:a="http://schemas.openxmlformats.org/drawingml/2006/main" xmlns:r="http://schemas.openxmlformats.org/officeDocument/2006/relationships" xmlns:p="http://schemas.openxmlformats.org/presentationml/2006/main">
+  <p:cSld>
+    <p:spTree>
+      <p:nvGrpSpPr>
+        <p:cNvPr id="1" name=""/>
+        <p:cNvGrpSpPr/>
+        <p:nvPr/>
+      </p:nvGrpSpPr>
+      <p:grpSpPr>
+        <a:xfrm>
+          <a:off x="0" y="0"/>
+          <a:ext cx="0" cy="0"/>
+          <a:chOff x="0" y="0"/>
+          <a:chExt cx="0" cy="0"/>
+        </a:xfrm>
+      </p:grpSpPr>
+      <p:pic>
+        <p:nvPicPr>
+          <p:cNvPr id="3076" name="Picture 4"/>
+          <p:cNvPicPr>
+            <a:picLocks noChangeAspect="1" noChangeArrowheads="1"/>
+          </p:cNvPicPr>
+          <p:nvPr/>
+        </p:nvPicPr>
+        <p:blipFill>
+          <a:blip r:embed="rId3">
+            <a:extLst>
+              <a:ext uri="{28A0092B-C50C-407E-A947-70E740481C1C}">
+                <a14:useLocalDpi xmlns:a14="http://schemas.microsoft.com/office/drawing/2010/main" val="0"/>
+              </a:ext>
+            </a:extLst>
+          </a:blip>
+          <a:srcRect/>
+          <a:stretch>
+            <a:fillRect/>
+          </a:stretch>
+        </p:blipFill>
+        <p:spPr bwMode="auto">
+          <a:xfrm>
+            <a:off x="1447800" y="1143000"/>
+            <a:ext cx="6429375" cy="5443538"/>
+          </a:xfrm>
+          <a:prstGeom prst="rect">
+            <a:avLst/>
+          </a:prstGeom>
+          <a:noFill/>
+          <a:ln>
+            <a:noFill/>
+          </a:ln>
+          <a:extLst>
+            <a:ext uri="{909E8E84-426E-40DD-AFC4-6F175D3DCCD1}">
+              <a14:hiddenFill xmlns:a14="http://schemas.microsoft.com/office/drawing/2010/main">
+                <a:solidFill>
+                  <a:schemeClr val="accent1"/>
+                </a:solidFill>
+              </a14:hiddenFill>
+            </a:ext>
+            <a:ext uri="{91240B29-F687-4F45-9708-019B960494DF}">
+              <a14:hiddenLine xmlns:a14="http://schemas.microsoft.com/office/drawing/2010/main" w="9525">
+                <a:solidFill>
+                  <a:schemeClr val="tx1"/>
+                </a:solidFill>
+                <a:miter lim="800000"/>
+                <a:headEnd/>
+                <a:tailEnd/>
+              </a14:hiddenLine>
+            </a:ext>
+          </a:extLst>
+        </p:spPr>
+      </p:pic>
+      <p:sp>
+        <p:nvSpPr>
+          <p:cNvPr id="2" name="Title 1"/>
+          <p:cNvSpPr>
+            <a:spLocks noGrp="1"/>
+          </p:cNvSpPr>
+          <p:nvPr>
+            <p:ph type="title"/>
+          </p:nvPr>
+        </p:nvSpPr>
+        <p:spPr/>
+        <p:txBody>
+          <a:bodyPr/>
+          <a:lstStyle/>
+          <a:p>
+            <a:r>
+              <a:rPr lang="en-US" dirty="0" smtClean="0"/>
+              <a:t>Date and times</a:t>
+            </a:r>
+            <a:endParaRPr lang="en-US" dirty="0"/>
+          </a:p>
+        </p:txBody>
+      </p:sp>
+      <p:pic>
+        <p:nvPicPr>
+          <p:cNvPr id="3075" name="Picture 3"/>
+          <p:cNvPicPr>
+            <a:picLocks noChangeAspect="1" noChangeArrowheads="1"/>
+          </p:cNvPicPr>
+          <p:nvPr/>
+        </p:nvPicPr>
+        <p:blipFill>
+          <a:blip r:embed="rId4">
+            <a:extLst>
+              <a:ext uri="{28A0092B-C50C-407E-A947-70E740481C1C}">
+                <a14:useLocalDpi xmlns:a14="http://schemas.microsoft.com/office/drawing/2010/main" val="0"/>
+              </a:ext>
+            </a:extLst>
+          </a:blip>
+          <a:srcRect/>
+          <a:stretch>
+            <a:fillRect/>
+          </a:stretch>
+        </p:blipFill>
+        <p:spPr bwMode="auto">
+          <a:xfrm>
+            <a:off x="2133600" y="2590800"/>
+            <a:ext cx="6129338" cy="3143250"/>
+          </a:xfrm>
+          <a:prstGeom prst="rect">
+            <a:avLst/>
+          </a:prstGeom>
+          <a:noFill/>
+          <a:ln>
+            <a:noFill/>
+          </a:ln>
+          <a:extLst>
+            <a:ext uri="{909E8E84-426E-40DD-AFC4-6F175D3DCCD1}">
+              <a14:hiddenFill xmlns:a14="http://schemas.microsoft.com/office/drawing/2010/main">
+                <a:solidFill>
+                  <a:schemeClr val="accent1"/>
+                </a:solidFill>
+              </a14:hiddenFill>
+            </a:ext>
+            <a:ext uri="{91240B29-F687-4F45-9708-019B960494DF}">
+              <a14:hiddenLine xmlns:a14="http://schemas.microsoft.com/office/drawing/2010/main" w="9525">
+                <a:solidFill>
+                  <a:schemeClr val="tx1"/>
+                </a:solidFill>
+                <a:miter lim="800000"/>
+                <a:headEnd/>
+                <a:tailEnd/>
+              </a14:hiddenLine>
+            </a:ext>
+          </a:extLst>
+        </p:spPr>
+      </p:pic>
+    </p:spTree>
+    <p:extLst>
+      <p:ext uri="{BB962C8B-B14F-4D97-AF65-F5344CB8AC3E}">
+        <p14:creationId xmlns:p14="http://schemas.microsoft.com/office/powerpoint/2010/main" val="202181269"/>
+      </p:ext>
+    </p:extLst>
+  </p:cSld>
+  <p:clrMapOvr>
+    <a:masterClrMapping/>
+  </p:clrMapOvr>
+  <p:timing>
+    <p:tnLst>
+      <p:par>
+        <p:cTn id="1" dur="indefinite" restart="never" nodeType="tmRoot">
+          <p:childTnLst>
+            <p:seq concurrent="1" nextAc="seek">
+              <p:cTn id="2" dur="indefinite" nodeType="mainSeq">
+                <p:childTnLst>
+                  <p:par>
+                    <p:cTn id="3" fill="hold">
+                      <p:stCondLst>
+                        <p:cond delay="indefinite"/>
+                      </p:stCondLst>
+                      <p:childTnLst>
+                        <p:par>
+                          <p:cTn id="4" fill="hold">
+                            <p:stCondLst>
+                              <p:cond delay="0"/>
+                            </p:stCondLst>
+                            <p:childTnLst>
+                              <p:par>
+                                <p:cTn id="5" presetID="1" presetClass="entr" presetSubtype="0" fill="hold" nodeType="clickEffect">
+                                  <p:stCondLst>
+                                    <p:cond delay="0"/>
+                                  </p:stCondLst>
+                                  <p:childTnLst>
+                                    <p:set>
+                                      <p:cBhvr>
+                                        <p:cTn id="6" dur="1" fill="hold">
+                                          <p:stCondLst>
+                                            <p:cond delay="0"/>
+                                          </p:stCondLst>
+                                        </p:cTn>
+                                        <p:tgtEl>
+                                          <p:spTgt spid="3075"/>
+                                        </p:tgtEl>
+                                        <p:attrNameLst>
+                                          <p:attrName>style.visibility</p:attrName>
+                                        </p:attrNameLst>
+                                      </p:cBhvr>
+                                      <p:to>
+                                        <p:strVal val="visible"/>
+                                      </p:to>
+                                    </p:set>
+                                  </p:childTnLst>
+                                </p:cTn>
+                              </p:par>
+                            </p:childTnLst>
+                          </p:cTn>
+                        </p:par>
+                      </p:childTnLst>
+                    </p:cTn>
+                  </p:par>
+                </p:childTnLst>
+              </p:cTn>
+              <p:prevCondLst>
+                <p:cond evt="onPrev" delay="0">
+                  <p:tgtEl>
+                    <p:sldTgt/>
+                  </p:tgtEl>
+                </p:cond>
+              </p:prevCondLst>
+              <p:nextCondLst>
+                <p:cond evt="onNext" delay="0">
+                  <p:tgtEl>
+                    <p:sldTgt/>
+                  </p:tgtEl>
+                </p:cond>
+              </p:nextCondLst>
+            </p:seq>
+          </p:childTnLst>
+        </p:cTn>
+      </p:par>
+    </p:tnLst>
+  </p:timing>
+</p:sld>
+</file>
+
+<file path=ppt/slides/slide17.xml><?xml version="1.0" encoding="utf-8"?>
+<p:sld xmlns:a="http://schemas.openxmlformats.org/drawingml/2006/main" xmlns:r="http://schemas.openxmlformats.org/officeDocument/2006/relationships" xmlns:p="http://schemas.openxmlformats.org/presentationml/2006/main">
+  <p:cSld>
+    <p:spTree>
+      <p:nvGrpSpPr>
+        <p:cNvPr id="1" name=""/>
+        <p:cNvGrpSpPr/>
+        <p:nvPr/>
+      </p:nvGrpSpPr>
+      <p:grpSpPr>
+        <a:xfrm>
+          <a:off x="0" y="0"/>
+          <a:ext cx="0" cy="0"/>
+          <a:chOff x="0" y="0"/>
+          <a:chExt cx="0" cy="0"/>
+        </a:xfrm>
+      </p:grpSpPr>
+      <p:sp>
+        <p:nvSpPr>
+          <p:cNvPr id="2" name="Title 1"/>
+          <p:cNvSpPr>
+            <a:spLocks noGrp="1"/>
+          </p:cNvSpPr>
+          <p:nvPr>
+            <p:ph type="title"/>
+          </p:nvPr>
+        </p:nvSpPr>
+        <p:spPr/>
+        <p:txBody>
+          <a:bodyPr/>
+          <a:lstStyle/>
+          <a:p>
+            <a:r>
+              <a:rPr lang="en-US" dirty="0" smtClean="0"/>
+              <a:t>Date and times</a:t>
+            </a:r>
+            <a:endParaRPr lang="en-US" dirty="0"/>
+          </a:p>
+        </p:txBody>
+      </p:sp>
+      <p:pic>
+        <p:nvPicPr>
+          <p:cNvPr id="4098" name="Picture 2"/>
+          <p:cNvPicPr>
+            <a:picLocks noChangeAspect="1" noChangeArrowheads="1"/>
+          </p:cNvPicPr>
+          <p:nvPr/>
+        </p:nvPicPr>
+        <p:blipFill>
+          <a:blip r:embed="rId3">
+            <a:extLst>
+              <a:ext uri="{28A0092B-C50C-407E-A947-70E740481C1C}">
+                <a14:useLocalDpi xmlns:a14="http://schemas.microsoft.com/office/drawing/2010/main" val="0"/>
+              </a:ext>
+            </a:extLst>
+          </a:blip>
+          <a:srcRect/>
+          <a:stretch>
+            <a:fillRect/>
+          </a:stretch>
+        </p:blipFill>
+        <p:spPr bwMode="auto">
+          <a:xfrm>
+            <a:off x="1066800" y="1619250"/>
+            <a:ext cx="6515100" cy="1357313"/>
+          </a:xfrm>
+          <a:prstGeom prst="rect">
+            <a:avLst/>
+          </a:prstGeom>
+          <a:noFill/>
+          <a:ln>
+            <a:noFill/>
+          </a:ln>
+          <a:extLst>
+            <a:ext uri="{909E8E84-426E-40DD-AFC4-6F175D3DCCD1}">
+              <a14:hiddenFill xmlns:a14="http://schemas.microsoft.com/office/drawing/2010/main">
+                <a:solidFill>
+                  <a:schemeClr val="accent1"/>
+                </a:solidFill>
+              </a14:hiddenFill>
+            </a:ext>
+            <a:ext uri="{91240B29-F687-4F45-9708-019B960494DF}">
+              <a14:hiddenLine xmlns:a14="http://schemas.microsoft.com/office/drawing/2010/main" w="9525">
+                <a:solidFill>
+                  <a:schemeClr val="tx1"/>
+                </a:solidFill>
+                <a:miter lim="800000"/>
+                <a:headEnd/>
+                <a:tailEnd/>
+              </a14:hiddenLine>
+            </a:ext>
+          </a:extLst>
+        </p:spPr>
+      </p:pic>
+      <p:pic>
+        <p:nvPicPr>
+          <p:cNvPr id="4099" name="Picture 3"/>
+          <p:cNvPicPr>
+            <a:picLocks noChangeAspect="1" noChangeArrowheads="1"/>
+          </p:cNvPicPr>
+          <p:nvPr/>
+        </p:nvPicPr>
+        <p:blipFill>
+          <a:blip r:embed="rId4">
+            <a:extLst>
+              <a:ext uri="{28A0092B-C50C-407E-A947-70E740481C1C}">
+                <a14:useLocalDpi xmlns:a14="http://schemas.microsoft.com/office/drawing/2010/main" val="0"/>
+              </a:ext>
+            </a:extLst>
+          </a:blip>
+          <a:srcRect/>
+          <a:stretch>
+            <a:fillRect/>
+          </a:stretch>
+        </p:blipFill>
+        <p:spPr bwMode="auto">
+          <a:xfrm>
+            <a:off x="533400" y="3787186"/>
+            <a:ext cx="8415338" cy="1957388"/>
+          </a:xfrm>
+          <a:prstGeom prst="rect">
+            <a:avLst/>
+          </a:prstGeom>
+          <a:noFill/>
+          <a:ln>
+            <a:noFill/>
+          </a:ln>
+          <a:extLst>
+            <a:ext uri="{909E8E84-426E-40DD-AFC4-6F175D3DCCD1}">
+              <a14:hiddenFill xmlns:a14="http://schemas.microsoft.com/office/drawing/2010/main">
+                <a:solidFill>
+                  <a:schemeClr val="accent1"/>
+                </a:solidFill>
+              </a14:hiddenFill>
+            </a:ext>
+            <a:ext uri="{91240B29-F687-4F45-9708-019B960494DF}">
+              <a14:hiddenLine xmlns:a14="http://schemas.microsoft.com/office/drawing/2010/main" w="9525">
+                <a:solidFill>
+                  <a:schemeClr val="tx1"/>
+                </a:solidFill>
+                <a:miter lim="800000"/>
+                <a:headEnd/>
+                <a:tailEnd/>
+              </a14:hiddenLine>
+            </a:ext>
+          </a:extLst>
+        </p:spPr>
+      </p:pic>
+    </p:spTree>
+    <p:extLst>
+      <p:ext uri="{BB962C8B-B14F-4D97-AF65-F5344CB8AC3E}">
+        <p14:creationId xmlns:p14="http://schemas.microsoft.com/office/powerpoint/2010/main" val="1299656880"/>
+      </p:ext>
+    </p:extLst>
+  </p:cSld>
+  <p:clrMapOvr>
+    <a:masterClrMapping/>
+  </p:clrMapOvr>
+  <p:timing>
+    <p:tnLst>
+      <p:par>
+        <p:cTn id="1" dur="indefinite" restart="never" nodeType="tmRoot">
+          <p:childTnLst>
+            <p:seq concurrent="1" nextAc="seek">
+              <p:cTn id="2" dur="indefinite" nodeType="mainSeq">
+                <p:childTnLst>
+                  <p:par>
+                    <p:cTn id="3" fill="hold">
+                      <p:stCondLst>
+                        <p:cond delay="indefinite"/>
+                      </p:stCondLst>
+                      <p:childTnLst>
+                        <p:par>
+                          <p:cTn id="4" fill="hold">
+                            <p:stCondLst>
+                              <p:cond delay="0"/>
+                            </p:stCondLst>
+                            <p:childTnLst>
+                              <p:par>
+                                <p:cTn id="5" presetID="1" presetClass="entr" presetSubtype="0" fill="hold" nodeType="clickEffect">
+                                  <p:stCondLst>
+                                    <p:cond delay="0"/>
+                                  </p:stCondLst>
+                                  <p:childTnLst>
+                                    <p:set>
+                                      <p:cBhvr>
+                                        <p:cTn id="6" dur="1" fill="hold">
+                                          <p:stCondLst>
+                                            <p:cond delay="0"/>
+                                          </p:stCondLst>
+                                        </p:cTn>
+                                        <p:tgtEl>
+                                          <p:spTgt spid="4099"/>
+                                        </p:tgtEl>
+                                        <p:attrNameLst>
+                                          <p:attrName>style.visibility</p:attrName>
+                                        </p:attrNameLst>
+                                      </p:cBhvr>
+                                      <p:to>
+                                        <p:strVal val="visible"/>
+                                      </p:to>
+                                    </p:set>
+                                  </p:childTnLst>
+                                </p:cTn>
+                              </p:par>
+                            </p:childTnLst>
+                          </p:cTn>
+                        </p:par>
+                      </p:childTnLst>
+                    </p:cTn>
+                  </p:par>
+                </p:childTnLst>
+              </p:cTn>
+              <p:prevCondLst>
+                <p:cond evt="onPrev" delay="0">
+                  <p:tgtEl>
+                    <p:sldTgt/>
+                  </p:tgtEl>
+                </p:cond>
+              </p:prevCondLst>
+              <p:nextCondLst>
+                <p:cond evt="onNext" delay="0">
+                  <p:tgtEl>
+                    <p:sldTgt/>
+                  </p:tgtEl>
+                </p:cond>
+              </p:nextCondLst>
+            </p:seq>
+          </p:childTnLst>
+        </p:cTn>
+      </p:par>
+    </p:tnLst>
+  </p:timing>
+</p:sld>
+</file>
+
+<file path=ppt/slides/slide18.xml><?xml version="1.0" encoding="utf-8"?>
+<p:sld xmlns:a="http://schemas.openxmlformats.org/drawingml/2006/main" xmlns:r="http://schemas.openxmlformats.org/officeDocument/2006/relationships" xmlns:p="http://schemas.openxmlformats.org/presentationml/2006/main">
+  <p:cSld>
+    <p:spTree>
+      <p:nvGrpSpPr>
+        <p:cNvPr id="1" name=""/>
+        <p:cNvGrpSpPr/>
+        <p:nvPr/>
+      </p:nvGrpSpPr>
+      <p:grpSpPr>
+        <a:xfrm>
+          <a:off x="0" y="0"/>
+          <a:ext cx="0" cy="0"/>
+          <a:chOff x="0" y="0"/>
+          <a:chExt cx="0" cy="0"/>
+        </a:xfrm>
+      </p:grpSpPr>
+      <p:sp>
+        <p:nvSpPr>
+          <p:cNvPr id="2" name="Title 1"/>
+          <p:cNvSpPr>
+            <a:spLocks noGrp="1"/>
+          </p:cNvSpPr>
+          <p:nvPr>
+            <p:ph type="title"/>
+          </p:nvPr>
+        </p:nvSpPr>
+        <p:spPr/>
+        <p:txBody>
+          <a:bodyPr/>
+          <a:lstStyle/>
+          <a:p>
+            <a:r>
+              <a:rPr lang="en-US" dirty="0" smtClean="0"/>
+              <a:t>Method overloading</a:t>
+            </a:r>
+            <a:endParaRPr lang="en-US" dirty="0"/>
+          </a:p>
+        </p:txBody>
+      </p:sp>
+      <p:sp>
+        <p:nvSpPr>
+          <p:cNvPr id="3" name="Content Placeholder 2"/>
+          <p:cNvSpPr>
+            <a:spLocks noGrp="1"/>
+          </p:cNvSpPr>
+          <p:nvPr>
+            <p:ph idx="1"/>
+          </p:nvPr>
+        </p:nvSpPr>
+        <p:spPr/>
+        <p:txBody>
+          <a:bodyPr/>
+          <a:lstStyle/>
+          <a:p>
+            <a:pPr marL="0" indent="0">
+              <a:buNone/>
+            </a:pPr>
+            <a:r>
+              <a:rPr lang="en-US" dirty="0" smtClean="0"/>
+              <a:t>A class can have more than one method with the same name.</a:t>
+            </a:r>
+          </a:p>
+          <a:p>
+            <a:pPr marL="0" indent="0">
+              <a:buNone/>
+            </a:pPr>
+            <a:r>
+              <a:rPr lang="en-US" dirty="0" smtClean="0"/>
+              <a:t>The arguments must be different.</a:t>
+            </a:r>
+          </a:p>
+          <a:p>
+            <a:pPr marL="0" indent="0">
+              <a:buNone/>
+            </a:pPr>
+            <a:r>
+              <a:rPr lang="en-US" dirty="0" smtClean="0"/>
+              <a:t>It can be used for default values.</a:t>
+            </a:r>
+            <a:endParaRPr lang="en-US" dirty="0"/>
+          </a:p>
+        </p:txBody>
+      </p:sp>
+    </p:spTree>
+    <p:extLst>
+      <p:ext uri="{BB962C8B-B14F-4D97-AF65-F5344CB8AC3E}">
+        <p14:creationId xmlns:p14="http://schemas.microsoft.com/office/powerpoint/2010/main" val="2970571130"/>
+      </p:ext>
+    </p:extLst>
+  </p:cSld>
+  <p:clrMapOvr>
+    <a:masterClrMapping/>
+  </p:clrMapOvr>
+  <p:timing>
+    <p:tnLst>
+      <p:par>
+        <p:cTn id="1" dur="indefinite" restart="never" nodeType="tmRoot"/>
+      </p:par>
+    </p:tnLst>
+  </p:timing>
+</p:sld>
+</file>
+
+<file path=ppt/slides/slide19.xml><?xml version="1.0" encoding="utf-8"?>
+<p:sld xmlns:a="http://schemas.openxmlformats.org/drawingml/2006/main" xmlns:r="http://schemas.openxmlformats.org/officeDocument/2006/relationships" xmlns:p="http://schemas.openxmlformats.org/presentationml/2006/main">
+  <p:cSld>
+    <p:spTree>
+      <p:nvGrpSpPr>
+        <p:cNvPr id="1" name=""/>
+        <p:cNvGrpSpPr/>
+        <p:nvPr/>
+      </p:nvGrpSpPr>
+      <p:grpSpPr>
+        <a:xfrm>
+          <a:off x="0" y="0"/>
+          <a:ext cx="0" cy="0"/>
+          <a:chOff x="0" y="0"/>
+          <a:chExt cx="0" cy="0"/>
+        </a:xfrm>
+      </p:grpSpPr>
+      <p:sp>
+        <p:nvSpPr>
+          <p:cNvPr id="2" name="Title 1"/>
+          <p:cNvSpPr>
+            <a:spLocks noGrp="1"/>
+          </p:cNvSpPr>
+          <p:nvPr>
+            <p:ph type="title"/>
+          </p:nvPr>
+        </p:nvSpPr>
+        <p:spPr/>
+        <p:txBody>
+          <a:bodyPr/>
+          <a:lstStyle/>
+          <a:p>
+            <a:r>
+              <a:rPr lang="en-US" dirty="0" smtClean="0"/>
+              <a:t>Method overloading</a:t>
+            </a:r>
+            <a:endParaRPr lang="en-US" dirty="0"/>
+          </a:p>
+        </p:txBody>
+      </p:sp>
+      <p:pic>
+        <p:nvPicPr>
+          <p:cNvPr id="5122" name="Picture 2"/>
+          <p:cNvPicPr>
+            <a:picLocks noChangeAspect="1" noChangeArrowheads="1"/>
+          </p:cNvPicPr>
+          <p:nvPr/>
+        </p:nvPicPr>
+        <p:blipFill>
+          <a:blip r:embed="rId3">
+            <a:extLst>
+              <a:ext uri="{28A0092B-C50C-407E-A947-70E740481C1C}">
+                <a14:useLocalDpi xmlns:a14="http://schemas.microsoft.com/office/drawing/2010/main" val="0"/>
+              </a:ext>
+            </a:extLst>
+          </a:blip>
+          <a:srcRect/>
+          <a:stretch>
+            <a:fillRect/>
+          </a:stretch>
+        </p:blipFill>
+        <p:spPr bwMode="auto">
+          <a:xfrm>
+            <a:off x="1600200" y="2209800"/>
+            <a:ext cx="6100763" cy="2428875"/>
+          </a:xfrm>
+          <a:prstGeom prst="rect">
+            <a:avLst/>
+          </a:prstGeom>
+          <a:noFill/>
+          <a:ln>
+            <a:noFill/>
+          </a:ln>
+          <a:extLst>
+            <a:ext uri="{909E8E84-426E-40DD-AFC4-6F175D3DCCD1}">
+              <a14:hiddenFill xmlns:a14="http://schemas.microsoft.com/office/drawing/2010/main">
+                <a:solidFill>
+                  <a:schemeClr val="accent1"/>
+                </a:solidFill>
+              </a14:hiddenFill>
+            </a:ext>
+            <a:ext uri="{91240B29-F687-4F45-9708-019B960494DF}">
+              <a14:hiddenLine xmlns:a14="http://schemas.microsoft.com/office/drawing/2010/main" w="9525">
+                <a:solidFill>
+                  <a:schemeClr val="tx1"/>
+                </a:solidFill>
+                <a:miter lim="800000"/>
+                <a:headEnd/>
+                <a:tailEnd/>
+              </a14:hiddenLine>
+            </a:ext>
+          </a:extLst>
+        </p:spPr>
+      </p:pic>
+    </p:spTree>
+    <p:extLst>
+      <p:ext uri="{BB962C8B-B14F-4D97-AF65-F5344CB8AC3E}">
+        <p14:creationId xmlns:p14="http://schemas.microsoft.com/office/powerpoint/2010/main" val="655682019"/>
       </p:ext>
     </p:extLst>
   </p:cSld>

</xml_diff>